<commit_message>
Update Project Design Presentation My Vacation.pptx
</commit_message>
<xml_diff>
--- a/Project Design Presentation My Vacation.pptx
+++ b/Project Design Presentation My Vacation.pptx
@@ -268,7 +268,7 @@
           <a:p>
             <a:fld id="{0EF95162-6873-F647-B392-BF6A1F606277}" type="datetimeFigureOut">
               <a:rPr lang="it-IT" smtClean="0"/>
-              <a:t>03/12/22</a:t>
+              <a:t>04/12/2022</a:t>
             </a:fld>
             <a:endParaRPr lang="it-IT"/>
           </a:p>
@@ -722,7 +722,7 @@
           <a:p>
             <a:fld id="{2FDCBEE4-315A-8E42-835E-29A1DAE07625}" type="datetimeFigureOut">
               <a:rPr lang="it-IT" smtClean="0"/>
-              <a:t>03/12/22</a:t>
+              <a:t>04/12/2022</a:t>
             </a:fld>
             <a:endParaRPr lang="it-IT"/>
           </a:p>
@@ -914,7 +914,7 @@
           <a:p>
             <a:fld id="{2FDCBEE4-315A-8E42-835E-29A1DAE07625}" type="datetimeFigureOut">
               <a:rPr lang="it-IT" smtClean="0"/>
-              <a:t>03/12/22</a:t>
+              <a:t>04/12/2022</a:t>
             </a:fld>
             <a:endParaRPr lang="it-IT"/>
           </a:p>
@@ -1116,7 +1116,7 @@
           <a:p>
             <a:fld id="{2FDCBEE4-315A-8E42-835E-29A1DAE07625}" type="datetimeFigureOut">
               <a:rPr lang="it-IT" smtClean="0"/>
-              <a:t>03/12/22</a:t>
+              <a:t>04/12/2022</a:t>
             </a:fld>
             <a:endParaRPr lang="it-IT"/>
           </a:p>
@@ -1308,7 +1308,7 @@
           <a:p>
             <a:fld id="{2FDCBEE4-315A-8E42-835E-29A1DAE07625}" type="datetimeFigureOut">
               <a:rPr lang="it-IT" smtClean="0"/>
-              <a:t>03/12/22</a:t>
+              <a:t>04/12/2022</a:t>
             </a:fld>
             <a:endParaRPr lang="it-IT"/>
           </a:p>
@@ -1577,7 +1577,7 @@
           <a:p>
             <a:fld id="{2FDCBEE4-315A-8E42-835E-29A1DAE07625}" type="datetimeFigureOut">
               <a:rPr lang="it-IT" smtClean="0"/>
-              <a:t>03/12/22</a:t>
+              <a:t>04/12/2022</a:t>
             </a:fld>
             <a:endParaRPr lang="it-IT"/>
           </a:p>
@@ -1886,7 +1886,7 @@
           <a:p>
             <a:fld id="{2FDCBEE4-315A-8E42-835E-29A1DAE07625}" type="datetimeFigureOut">
               <a:rPr lang="it-IT" smtClean="0"/>
-              <a:t>03/12/22</a:t>
+              <a:t>04/12/2022</a:t>
             </a:fld>
             <a:endParaRPr lang="it-IT"/>
           </a:p>
@@ -2329,7 +2329,7 @@
           <a:p>
             <a:fld id="{2FDCBEE4-315A-8E42-835E-29A1DAE07625}" type="datetimeFigureOut">
               <a:rPr lang="it-IT" smtClean="0"/>
-              <a:t>03/12/22</a:t>
+              <a:t>04/12/2022</a:t>
             </a:fld>
             <a:endParaRPr lang="it-IT"/>
           </a:p>
@@ -2470,7 +2470,7 @@
           <a:p>
             <a:fld id="{2FDCBEE4-315A-8E42-835E-29A1DAE07625}" type="datetimeFigureOut">
               <a:rPr lang="it-IT" smtClean="0"/>
-              <a:t>03/12/22</a:t>
+              <a:t>04/12/2022</a:t>
             </a:fld>
             <a:endParaRPr lang="it-IT"/>
           </a:p>
@@ -2589,7 +2589,7 @@
           <a:p>
             <a:fld id="{2FDCBEE4-315A-8E42-835E-29A1DAE07625}" type="datetimeFigureOut">
               <a:rPr lang="it-IT" smtClean="0"/>
-              <a:t>03/12/22</a:t>
+              <a:t>04/12/2022</a:t>
             </a:fld>
             <a:endParaRPr lang="it-IT"/>
           </a:p>
@@ -2888,7 +2888,7 @@
           <a:p>
             <a:fld id="{2FDCBEE4-315A-8E42-835E-29A1DAE07625}" type="datetimeFigureOut">
               <a:rPr lang="it-IT" smtClean="0"/>
-              <a:t>03/12/22</a:t>
+              <a:t>04/12/2022</a:t>
             </a:fld>
             <a:endParaRPr lang="it-IT"/>
           </a:p>
@@ -3164,7 +3164,7 @@
           <a:p>
             <a:fld id="{2FDCBEE4-315A-8E42-835E-29A1DAE07625}" type="datetimeFigureOut">
               <a:rPr lang="it-IT" smtClean="0"/>
-              <a:t>03/12/22</a:t>
+              <a:t>04/12/2022</a:t>
             </a:fld>
             <a:endParaRPr lang="it-IT"/>
           </a:p>
@@ -3995,7 +3995,7 @@
         <p:spPr>
           <a:xfrm>
             <a:off x="424543" y="1404256"/>
-            <a:ext cx="8343900" cy="2862322"/>
+            <a:ext cx="8343900" cy="3139321"/>
           </a:xfrm>
           <a:prstGeom prst="rect">
             <a:avLst/>
@@ -4103,30 +4103,13 @@
               <a:buChar char="•"/>
             </a:pPr>
             <a:r>
+              <a:rPr lang="en-US" b="1" dirty="0"/>
+              <a:t>Users</a:t>
+            </a:r>
+            <a:r>
               <a:rPr lang="en-US" dirty="0"/>
-              <a:t>Each </a:t>
-            </a:r>
-            <a:r>
-              <a:rPr lang="en-US" b="1" dirty="0"/>
-              <a:t>user </a:t>
-            </a:r>
-            <a:r>
-              <a:rPr lang="en-US" dirty="0"/>
-              <a:t>can add </a:t>
-            </a:r>
-            <a:r>
-              <a:rPr lang="en-US" dirty="0" err="1"/>
-              <a:t>accomodation</a:t>
-            </a:r>
-            <a:r>
-              <a:rPr lang="en-US" dirty="0"/>
-              <a:t> or activity in his personal </a:t>
-            </a:r>
-            <a:r>
-              <a:rPr lang="en-US" dirty="0" err="1"/>
-              <a:t>wishlist</a:t>
-            </a:r>
-            <a:endParaRPr lang="en-US" dirty="0"/>
+              <a:t> can report an accommodation or an activity</a:t>
+            </a:r>
           </a:p>
           <a:p>
             <a:pPr marL="285750" indent="-285750">
@@ -4134,13 +4117,30 @@
               <a:buChar char="•"/>
             </a:pPr>
             <a:r>
+              <a:rPr lang="en-US" dirty="0"/>
+              <a:t>Each </a:t>
+            </a:r>
+            <a:r>
               <a:rPr lang="en-US" b="1" dirty="0"/>
-              <a:t>Admin </a:t>
+              <a:t>user </a:t>
             </a:r>
             <a:r>
               <a:rPr lang="en-US" dirty="0"/>
-              <a:t>can manage users, host and reviews. </a:t>
-            </a:r>
+              <a:t>can add </a:t>
+            </a:r>
+            <a:r>
+              <a:rPr lang="en-US" dirty="0" err="1"/>
+              <a:t>accomodation</a:t>
+            </a:r>
+            <a:r>
+              <a:rPr lang="en-US" dirty="0"/>
+              <a:t> or activity in his personal </a:t>
+            </a:r>
+            <a:r>
+              <a:rPr lang="en-US" dirty="0" err="1"/>
+              <a:t>wishlist</a:t>
+            </a:r>
+            <a:endParaRPr lang="en-US" dirty="0"/>
           </a:p>
           <a:p>
             <a:pPr marL="285750" indent="-285750">
@@ -4153,7 +4153,7 @@
             </a:r>
             <a:r>
               <a:rPr lang="en-US" dirty="0"/>
-              <a:t>can approve or disapprove an advertisement.</a:t>
+              <a:t>can manage users, host and reviews. </a:t>
             </a:r>
           </a:p>
           <a:p>
@@ -4167,7 +4167,21 @@
             </a:r>
             <a:r>
               <a:rPr lang="en-US" dirty="0"/>
-              <a:t>have access to analytics about application and advertisement.</a:t>
+              <a:t>can approve or disapprove an advertisement.</a:t>
+            </a:r>
+          </a:p>
+          <a:p>
+            <a:pPr marL="285750" indent="-285750">
+              <a:buFont typeface="Arial" panose="020B0604020202020204" pitchFamily="34" charset="0"/>
+              <a:buChar char="•"/>
+            </a:pPr>
+            <a:r>
+              <a:rPr lang="en-US" b="1" dirty="0"/>
+              <a:t>Admin </a:t>
+            </a:r>
+            <a:r>
+              <a:rPr lang="en-US" dirty="0"/>
+              <a:t>can have access to analytics about application and advertisement.</a:t>
             </a:r>
             <a:endParaRPr lang="en-US" b="1" dirty="0"/>
           </a:p>
@@ -4235,10 +4249,10 @@
       </p:sp>
       <p:pic>
         <p:nvPicPr>
-          <p:cNvPr id="5" name="Immagine 4">
+          <p:cNvPr id="4" name="Immagine 3">
             <a:extLst>
               <a:ext uri="{FF2B5EF4-FFF2-40B4-BE49-F238E27FC236}">
-                <a16:creationId xmlns:a16="http://schemas.microsoft.com/office/drawing/2014/main" id="{3F9D1566-D49E-3886-0184-104B537A3969}"/>
+                <a16:creationId xmlns:a16="http://schemas.microsoft.com/office/drawing/2014/main" id="{3538D977-7DC8-0115-A681-2F2A66EF69D3}"/>
               </a:ext>
             </a:extLst>
           </p:cNvPr>
@@ -4255,8 +4269,8 @@
         </p:blipFill>
         <p:spPr>
           <a:xfrm>
-            <a:off x="1974969" y="1233093"/>
-            <a:ext cx="5194062" cy="4816178"/>
+            <a:off x="1661953" y="1233093"/>
+            <a:ext cx="5820093" cy="5400814"/>
           </a:xfrm>
           <a:prstGeom prst="rect">
             <a:avLst/>
@@ -5125,8 +5139,8 @@
         </p:nvSpPr>
         <p:spPr>
           <a:xfrm>
-            <a:off x="1072662" y="1652954"/>
-            <a:ext cx="7825989" cy="3970318"/>
+            <a:off x="950742" y="1652954"/>
+            <a:ext cx="8328498" cy="4247317"/>
           </a:xfrm>
           <a:prstGeom prst="rect">
             <a:avLst/>
@@ -5165,9 +5179,10 @@
               <a:buChar char="•"/>
             </a:pPr>
             <a:r>
-              <a:rPr lang="it-IT" dirty="0"/>
-              <a:t>Host</a:t>
-            </a:r>
+              <a:rPr lang="it-IT" dirty="0" err="1"/>
+              <a:t>Accomodation</a:t>
+            </a:r>
+            <a:endParaRPr lang="it-IT" dirty="0"/>
           </a:p>
           <a:p>
             <a:pPr marL="285750" indent="-285750">
@@ -5175,10 +5190,9 @@
               <a:buChar char="•"/>
             </a:pPr>
             <a:r>
-              <a:rPr lang="it-IT" dirty="0" err="1"/>
-              <a:t>Accomodation</a:t>
-            </a:r>
-            <a:endParaRPr lang="it-IT" dirty="0"/>
+              <a:rPr lang="it-IT" dirty="0"/>
+              <a:t>Activity</a:t>
+            </a:r>
           </a:p>
           <a:p>
             <a:pPr marL="285750" indent="-285750">
@@ -5187,7 +5201,7 @@
             </a:pPr>
             <a:r>
               <a:rPr lang="it-IT" dirty="0"/>
-              <a:t>Activity</a:t>
+              <a:t>City</a:t>
             </a:r>
           </a:p>
           <a:p>
@@ -5227,19 +5241,11 @@
             </a:r>
             <a:r>
               <a:rPr lang="it-IT" dirty="0" err="1"/>
-              <a:t>accomodation</a:t>
-            </a:r>
-            <a:r>
-              <a:rPr lang="it-IT" dirty="0"/>
-              <a:t>/</a:t>
-            </a:r>
-            <a:r>
-              <a:rPr lang="it-IT" dirty="0" err="1"/>
-              <a:t>activity</a:t>
-            </a:r>
-            <a:r>
-              <a:rPr lang="it-IT" dirty="0"/>
-              <a:t> </a:t>
+              <a:t>accomodations</a:t>
+            </a:r>
+            <a:r>
+              <a:rPr lang="it-IT" dirty="0"/>
+              <a:t>/activities </a:t>
             </a:r>
             <a:r>
               <a:rPr lang="it-IT" dirty="0" err="1"/>
@@ -5269,19 +5275,11 @@
             </a:r>
             <a:r>
               <a:rPr lang="it-IT" dirty="0" err="1"/>
-              <a:t>accomodation</a:t>
-            </a:r>
-            <a:r>
-              <a:rPr lang="it-IT" dirty="0"/>
-              <a:t>/</a:t>
-            </a:r>
-            <a:r>
-              <a:rPr lang="it-IT" dirty="0" err="1"/>
-              <a:t>activity</a:t>
-            </a:r>
-            <a:r>
-              <a:rPr lang="it-IT" dirty="0"/>
-              <a:t> </a:t>
+              <a:t>accomodations</a:t>
+            </a:r>
+            <a:r>
+              <a:rPr lang="it-IT" dirty="0"/>
+              <a:t>/activities </a:t>
             </a:r>
             <a:r>
               <a:rPr lang="it-IT" dirty="0" err="1"/>
@@ -5301,19 +5299,11 @@
             </a:r>
             <a:r>
               <a:rPr lang="it-IT" dirty="0" err="1"/>
-              <a:t>accomodation</a:t>
-            </a:r>
-            <a:r>
-              <a:rPr lang="it-IT" dirty="0"/>
-              <a:t>/</a:t>
-            </a:r>
-            <a:r>
-              <a:rPr lang="it-IT" dirty="0" err="1"/>
-              <a:t>activity</a:t>
-            </a:r>
-            <a:r>
-              <a:rPr lang="it-IT" dirty="0"/>
-              <a:t>.</a:t>
+              <a:t>accomodations</a:t>
+            </a:r>
+            <a:r>
+              <a:rPr lang="it-IT" dirty="0"/>
+              <a:t>/activities.</a:t>
             </a:r>
           </a:p>
           <a:p>
@@ -5373,7 +5363,7 @@
             </a:pPr>
             <a:r>
               <a:rPr lang="it-IT" dirty="0"/>
-              <a:t>Show </a:t>
+              <a:t>Show the </a:t>
             </a:r>
             <a:r>
               <a:rPr lang="it-IT" dirty="0" err="1"/>
@@ -5385,7 +5375,7 @@
             </a:r>
             <a:r>
               <a:rPr lang="it-IT" dirty="0" err="1"/>
-              <a:t>selected</a:t>
+              <a:t>prenoted</a:t>
             </a:r>
             <a:r>
               <a:rPr lang="it-IT" dirty="0"/>
@@ -5393,11 +5383,11 @@
             </a:r>
             <a:r>
               <a:rPr lang="it-IT" dirty="0" err="1"/>
-              <a:t>acitivities</a:t>
-            </a:r>
-            <a:r>
-              <a:rPr lang="it-IT" dirty="0"/>
-              <a:t> for </a:t>
+              <a:t>accomodations</a:t>
+            </a:r>
+            <a:r>
+              <a:rPr lang="it-IT" dirty="0"/>
+              <a:t>/activities for </a:t>
             </a:r>
             <a:r>
               <a:rPr lang="it-IT" dirty="0" err="1"/>
@@ -5415,7 +5405,7 @@
             </a:pPr>
             <a:r>
               <a:rPr lang="it-IT" dirty="0"/>
-              <a:t>Show </a:t>
+              <a:t>Show the </a:t>
             </a:r>
             <a:r>
               <a:rPr lang="it-IT" dirty="0" err="1"/>
@@ -5435,19 +5425,11 @@
             </a:r>
             <a:r>
               <a:rPr lang="it-IT" dirty="0" err="1"/>
-              <a:t>accomodation</a:t>
-            </a:r>
-            <a:r>
-              <a:rPr lang="it-IT" dirty="0"/>
-              <a:t>/</a:t>
-            </a:r>
-            <a:r>
-              <a:rPr lang="it-IT" dirty="0" err="1"/>
-              <a:t>activity</a:t>
-            </a:r>
-            <a:r>
-              <a:rPr lang="it-IT" dirty="0"/>
-              <a:t>.</a:t>
+              <a:t>accomodations</a:t>
+            </a:r>
+            <a:r>
+              <a:rPr lang="it-IT" dirty="0"/>
+              <a:t>/activities.</a:t>
             </a:r>
           </a:p>
           <a:p>
@@ -5457,7 +5439,7 @@
             </a:pPr>
             <a:r>
               <a:rPr lang="it-IT" dirty="0"/>
-              <a:t>Show </a:t>
+              <a:t>Show the </a:t>
             </a:r>
             <a:r>
               <a:rPr lang="it-IT" dirty="0" err="1"/>
@@ -5473,15 +5455,41 @@
             </a:r>
             <a:r>
               <a:rPr lang="it-IT" dirty="0"/>
+              <a:t> cities.</a:t>
+            </a:r>
+          </a:p>
+          <a:p>
+            <a:pPr marL="285750" indent="-285750">
+              <a:buFont typeface="Arial" panose="020B0604020202020204" pitchFamily="34" charset="0"/>
+              <a:buChar char="•"/>
+            </a:pPr>
+            <a:r>
+              <a:rPr lang="it-IT" dirty="0"/>
+              <a:t>Show the </a:t>
+            </a:r>
+            <a:r>
+              <a:rPr lang="it-IT" dirty="0" err="1"/>
+              <a:t>most</a:t>
+            </a:r>
+            <a:r>
+              <a:rPr lang="it-IT" dirty="0"/>
               <a:t> </a:t>
             </a:r>
             <a:r>
               <a:rPr lang="it-IT" dirty="0" err="1"/>
-              <a:t>cities</a:t>
-            </a:r>
-            <a:r>
-              <a:rPr lang="it-IT" dirty="0"/>
-              <a:t>.</a:t>
+              <a:t>reported</a:t>
+            </a:r>
+            <a:r>
+              <a:rPr lang="it-IT" dirty="0"/>
+              <a:t> </a:t>
+            </a:r>
+            <a:r>
+              <a:rPr lang="it-IT" dirty="0" err="1"/>
+              <a:t>accomodations</a:t>
+            </a:r>
+            <a:r>
+              <a:rPr lang="it-IT" dirty="0"/>
+              <a:t>/activities.</a:t>
             </a:r>
           </a:p>
           <a:p>
@@ -5568,7 +5576,7 @@
         <p:spPr>
           <a:xfrm>
             <a:off x="620486" y="1926770"/>
-            <a:ext cx="3951514" cy="3416320"/>
+            <a:ext cx="3951514" cy="3693319"/>
           </a:xfrm>
           <a:prstGeom prst="rect">
             <a:avLst/>
@@ -5662,6 +5670,16 @@
             <a:r>
               <a:rPr lang="en-US" dirty="0"/>
               <a:t>MongoDB</a:t>
+            </a:r>
+          </a:p>
+          <a:p>
+            <a:pPr marL="285750" indent="-285750">
+              <a:buFont typeface="Arial" panose="020B0604020202020204" pitchFamily="34" charset="0"/>
+              <a:buChar char="•"/>
+            </a:pPr>
+            <a:r>
+              <a:rPr lang="en-US" dirty="0"/>
+              <a:t>Neo4J</a:t>
             </a:r>
           </a:p>
           <a:p>

</xml_diff>